<commit_message>
edit README to include multiple slide charting function
</commit_message>
<xml_diff>
--- a/chart-01.pptx
+++ b/chart-01.pptx
@@ -5,7 +5,7 @@
     <p:sldMasterId id="2147483648" r:id="rId1"/>
   </p:sldMasterIdLst>
   <p:sldIdLst>
-    <p:sldId id="262" r:id="rId2"/>
+    <p:sldId id="256" r:id="rId2"/>
   </p:sldIdLst>
   <p:sldSz cx="9144000" cy="6858000" type="screen4x3"/>
   <p:notesSz cx="6858000" cy="9144000"/>
@@ -123,6 +123,18 @@
 </p:presentation>
 </file>
 
+<file path=ppt/commentAuthors.xml><?xml version="1.0" encoding="utf-8"?>
+<p:cmAuthorLst xmlns:a="http://schemas.openxmlformats.org/drawingml/2006/main" xmlns:r="http://schemas.openxmlformats.org/officeDocument/2006/relationships" xmlns:p="http://schemas.openxmlformats.org/presentationml/2006/main">
+  <p:cmAuthor id="1" name="Ling, Debby (KPSNG)" initials="LD(" lastIdx="1" clrIdx="0">
+    <p:extLst>
+      <p:ext uri="{19B8F6BF-5375-455C-9EA6-DF929625EA0E}">
+        <p15:presenceInfo xmlns:p15="http://schemas.microsoft.com/office/powerpoint/2012/main" userId="Ling, Debby (KPSNG)" providerId="None"/>
+      </p:ext>
+    </p:extLst>
+  </p:cmAuthor>
+</p:cmAuthorLst>
+</file>
+
 <file path=ppt/slideLayouts/slideLayout1.xml><?xml version="1.0" encoding="utf-8"?>
 <p:sldLayout xmlns:a="http://schemas.openxmlformats.org/drawingml/2006/main" xmlns:r="http://schemas.openxmlformats.org/officeDocument/2006/relationships" xmlns:p="http://schemas.openxmlformats.org/presentationml/2006/main" preserve="1" userDrawn="1">
   <p:cSld name="Title Slide">
@@ -167,6 +179,39 @@
           <a:lstStyle/>
           <a:p>
             <a:endParaRPr lang="en-SG"/>
+          </a:p>
+        </p:txBody>
+      </p:sp>
+      <p:sp>
+        <p:nvSpPr>
+          <p:cNvPr id="3" name="Title 1">
+            <a:extLst>
+              <a:ext uri="{FF2B5EF4-FFF2-40B4-BE49-F238E27FC236}">
+                <a16:creationId xmlns:a16="http://schemas.microsoft.com/office/drawing/2014/main" id="{D0BFE15D-DE66-47C1-BE57-D81AE02ED45E}"/>
+              </a:ext>
+            </a:extLst>
+          </p:cNvPr>
+          <p:cNvSpPr>
+            <a:spLocks noGrp="1"/>
+          </p:cNvSpPr>
+          <p:nvPr>
+            <p:ph type="title"/>
+          </p:nvPr>
+        </p:nvSpPr>
+        <p:spPr>
+          <a:xfrm>
+            <a:off x="457200" y="274638"/>
+            <a:ext cx="8229600" cy="1143000"/>
+          </a:xfrm>
+        </p:spPr>
+        <p:txBody>
+          <a:bodyPr/>
+          <a:lstStyle/>
+          <a:p>
+            <a:r>
+              <a:rPr lang="en-US"/>
+              <a:t>Click to edit Master title style</a:t>
+            </a:r>
           </a:p>
         </p:txBody>
       </p:sp>
@@ -290,7 +335,7 @@
           <a:p>
             <a:fld id="{5BCAD085-E8A6-8845-BD4E-CB4CCA059FC4}" type="datetimeFigureOut">
               <a:rPr lang="en-US" smtClean="0"/>
-              <a:t>3/28/2021</a:t>
+              <a:t>3/31/2021</a:t>
             </a:fld>
             <a:endParaRPr lang="en-US"/>
           </a:p>
@@ -468,7 +513,7 @@
           <a:p>
             <a:fld id="{5BCAD085-E8A6-8845-BD4E-CB4CCA059FC4}" type="datetimeFigureOut">
               <a:rPr lang="en-US" smtClean="0"/>
-              <a:t>3/28/2021</a:t>
+              <a:t>3/31/2021</a:t>
             </a:fld>
             <a:endParaRPr lang="en-US"/>
           </a:p>
@@ -636,7 +681,7 @@
           <a:p>
             <a:fld id="{5BCAD085-E8A6-8845-BD4E-CB4CCA059FC4}" type="datetimeFigureOut">
               <a:rPr lang="en-US" smtClean="0"/>
-              <a:t>3/28/2021</a:t>
+              <a:t>3/31/2021</a:t>
             </a:fld>
             <a:endParaRPr lang="en-US"/>
           </a:p>
@@ -881,7 +926,7 @@
           <a:p>
             <a:fld id="{5BCAD085-E8A6-8845-BD4E-CB4CCA059FC4}" type="datetimeFigureOut">
               <a:rPr lang="en-US" smtClean="0"/>
-              <a:t>3/28/2021</a:t>
+              <a:t>3/31/2021</a:t>
             </a:fld>
             <a:endParaRPr lang="en-US"/>
           </a:p>
@@ -1166,7 +1211,7 @@
           <a:p>
             <a:fld id="{5BCAD085-E8A6-8845-BD4E-CB4CCA059FC4}" type="datetimeFigureOut">
               <a:rPr lang="en-US" smtClean="0"/>
-              <a:t>3/28/2021</a:t>
+              <a:t>3/31/2021</a:t>
             </a:fld>
             <a:endParaRPr lang="en-US"/>
           </a:p>
@@ -1585,7 +1630,7 @@
           <a:p>
             <a:fld id="{5BCAD085-E8A6-8845-BD4E-CB4CCA059FC4}" type="datetimeFigureOut">
               <a:rPr lang="en-US" smtClean="0"/>
-              <a:t>3/28/2021</a:t>
+              <a:t>3/31/2021</a:t>
             </a:fld>
             <a:endParaRPr lang="en-US"/>
           </a:p>
@@ -1702,7 +1747,7 @@
           <a:p>
             <a:fld id="{5BCAD085-E8A6-8845-BD4E-CB4CCA059FC4}" type="datetimeFigureOut">
               <a:rPr lang="en-US" smtClean="0"/>
-              <a:t>3/28/2021</a:t>
+              <a:t>3/31/2021</a:t>
             </a:fld>
             <a:endParaRPr lang="en-US"/>
           </a:p>
@@ -1797,7 +1842,7 @@
           <a:p>
             <a:fld id="{5BCAD085-E8A6-8845-BD4E-CB4CCA059FC4}" type="datetimeFigureOut">
               <a:rPr lang="en-US" smtClean="0"/>
-              <a:t>3/28/2021</a:t>
+              <a:t>3/31/2021</a:t>
             </a:fld>
             <a:endParaRPr lang="en-US"/>
           </a:p>
@@ -2102,7 +2147,7 @@
           <a:p>
             <a:fld id="{5BCAD085-E8A6-8845-BD4E-CB4CCA059FC4}" type="datetimeFigureOut">
               <a:rPr lang="en-US" smtClean="0"/>
-              <a:t>3/28/2021</a:t>
+              <a:t>3/31/2021</a:t>
             </a:fld>
             <a:endParaRPr lang="en-US"/>
           </a:p>
@@ -2354,7 +2399,7 @@
           <a:p>
             <a:fld id="{5BCAD085-E8A6-8845-BD4E-CB4CCA059FC4}" type="datetimeFigureOut">
               <a:rPr lang="en-US" smtClean="0"/>
-              <a:t>3/28/2021</a:t>
+              <a:t>3/31/2021</a:t>
             </a:fld>
             <a:endParaRPr lang="en-US"/>
           </a:p>
@@ -2565,7 +2610,7 @@
           <a:p>
             <a:fld id="{5BCAD085-E8A6-8845-BD4E-CB4CCA059FC4}" type="datetimeFigureOut">
               <a:rPr lang="en-US" smtClean="0"/>
-              <a:t>3/28/2021</a:t>
+              <a:t>3/31/2021</a:t>
             </a:fld>
             <a:endParaRPr lang="en-US"/>
           </a:p>
@@ -2942,10 +2987,10 @@
       </p:grpSpPr>
       <p:sp>
         <p:nvSpPr>
-          <p:cNvPr id="3" name="Table Placeholder 2">
+          <p:cNvPr id="2" name="Table Placeholder 1">
             <a:extLst>
               <a:ext uri="{FF2B5EF4-FFF2-40B4-BE49-F238E27FC236}">
-                <a16:creationId xmlns:a16="http://schemas.microsoft.com/office/drawing/2014/main" id="{2A9BC440-CAB9-4A36-8A3A-4903F1D08233}"/>
+                <a16:creationId xmlns:a16="http://schemas.microsoft.com/office/drawing/2014/main" id="{C3095AC9-B572-492E-AFE9-660DC5742E98}"/>
               </a:ext>
             </a:extLst>
           </p:cNvPr>
@@ -2958,10 +3003,35 @@
         </p:nvSpPr>
         <p:spPr/>
       </p:sp>
+      <p:sp>
+        <p:nvSpPr>
+          <p:cNvPr id="3" name="Title 2">
+            <a:extLst>
+              <a:ext uri="{FF2B5EF4-FFF2-40B4-BE49-F238E27FC236}">
+                <a16:creationId xmlns:a16="http://schemas.microsoft.com/office/drawing/2014/main" id="{6D2724E8-BD63-487F-A4DC-3511D75C6D26}"/>
+              </a:ext>
+            </a:extLst>
+          </p:cNvPr>
+          <p:cNvSpPr>
+            <a:spLocks noGrp="1"/>
+          </p:cNvSpPr>
+          <p:nvPr>
+            <p:ph type="title"/>
+          </p:nvPr>
+        </p:nvSpPr>
+        <p:spPr/>
+        <p:txBody>
+          <a:bodyPr/>
+          <a:lstStyle/>
+          <a:p>
+            <a:endParaRPr lang="en-SG"/>
+          </a:p>
+        </p:txBody>
+      </p:sp>
     </p:spTree>
     <p:extLst>
       <p:ext uri="{BB962C8B-B14F-4D97-AF65-F5344CB8AC3E}">
-        <p14:creationId xmlns:p14="http://schemas.microsoft.com/office/powerpoint/2010/main" val="1368933797"/>
+        <p14:creationId xmlns:p14="http://schemas.microsoft.com/office/powerpoint/2010/main" val="1956855624"/>
       </p:ext>
     </p:extLst>
   </p:cSld>
@@ -2974,7 +3044,7 @@
 <file path=ppt/theme/theme1.xml><?xml version="1.0" encoding="utf-8"?>
 <a:theme xmlns:a="http://schemas.openxmlformats.org/drawingml/2006/main" name="Office Theme">
   <a:themeElements>
-    <a:clrScheme name="Office">
+    <a:clrScheme name="Custom 4">
       <a:dk1>
         <a:sysClr val="windowText" lastClr="000000"/>
       </a:dk1>
@@ -2988,13 +3058,13 @@
         <a:srgbClr val="EEECE1"/>
       </a:lt2>
       <a:accent1>
-        <a:srgbClr val="4F81BD"/>
+        <a:srgbClr val="6565FF"/>
       </a:accent1>
       <a:accent2>
-        <a:srgbClr val="C0504D"/>
+        <a:srgbClr val="9999FE"/>
       </a:accent2>
       <a:accent3>
-        <a:srgbClr val="9BBB59"/>
+        <a:srgbClr val="CCCCFF"/>
       </a:accent3>
       <a:accent4>
         <a:srgbClr val="8064A2"/>

</xml_diff>